<commit_message>
Updated version, used in the workshop
</commit_message>
<xml_diff>
--- a/LogLoss/LogLossForMindef.pptx
+++ b/LogLoss/LogLossForMindef.pptx
@@ -203,7 +203,7 @@
           <a:p>
             <a:fld id="{641691BB-5B5D-BD4A-A574-FF854B42546B}" type="datetimeFigureOut">
               <a:rPr lang="en-US" smtClean="0"/>
-              <a:t>3/8/15</a:t>
+              <a:t>4/8/15</a:t>
             </a:fld>
             <a:endParaRPr lang="en-US"/>
           </a:p>
@@ -521,7 +521,15 @@
             </a:r>
             <a:r>
               <a:rPr lang="en-US" baseline="0" dirty="0" smtClean="0"/>
-              <a:t> we talk about the evaluation metric, I will give a simple introduction to the use case of this metric. F-1 score is the harmonic mean of precision and recall.</a:t>
+              <a:t> we talk about the evaluation metric, I will give a simple introduction to the </a:t>
+            </a:r>
+            <a:r>
+              <a:rPr lang="en-US" baseline="0" smtClean="0"/>
+              <a:t>use cases </a:t>
+            </a:r>
+            <a:r>
+              <a:rPr lang="en-US" baseline="0" dirty="0" smtClean="0"/>
+              <a:t>of this metric. F-1 score is the harmonic mean of precision and recall.</a:t>
             </a:r>
             <a:endParaRPr lang="en-US" dirty="0"/>
           </a:p>
@@ -1276,7 +1284,7 @@
           <a:p>
             <a:fld id="{7868DACB-D628-CB43-93A3-CD3C3EC12B87}" type="datetimeFigureOut">
               <a:rPr lang="en-US" smtClean="0"/>
-              <a:t>3/8/15</a:t>
+              <a:t>4/8/15</a:t>
             </a:fld>
             <a:endParaRPr lang="en-US"/>
           </a:p>
@@ -1446,7 +1454,7 @@
           <a:p>
             <a:fld id="{7868DACB-D628-CB43-93A3-CD3C3EC12B87}" type="datetimeFigureOut">
               <a:rPr lang="en-US" smtClean="0"/>
-              <a:t>3/8/15</a:t>
+              <a:t>4/8/15</a:t>
             </a:fld>
             <a:endParaRPr lang="en-US"/>
           </a:p>
@@ -1626,7 +1634,7 @@
           <a:p>
             <a:fld id="{7868DACB-D628-CB43-93A3-CD3C3EC12B87}" type="datetimeFigureOut">
               <a:rPr lang="en-US" smtClean="0"/>
-              <a:t>3/8/15</a:t>
+              <a:t>4/8/15</a:t>
             </a:fld>
             <a:endParaRPr lang="en-US"/>
           </a:p>
@@ -1796,7 +1804,7 @@
           <a:p>
             <a:fld id="{7868DACB-D628-CB43-93A3-CD3C3EC12B87}" type="datetimeFigureOut">
               <a:rPr lang="en-US" smtClean="0"/>
-              <a:t>3/8/15</a:t>
+              <a:t>4/8/15</a:t>
             </a:fld>
             <a:endParaRPr lang="en-US"/>
           </a:p>
@@ -2042,7 +2050,7 @@
           <a:p>
             <a:fld id="{7868DACB-D628-CB43-93A3-CD3C3EC12B87}" type="datetimeFigureOut">
               <a:rPr lang="en-US" smtClean="0"/>
-              <a:t>3/8/15</a:t>
+              <a:t>4/8/15</a:t>
             </a:fld>
             <a:endParaRPr lang="en-US"/>
           </a:p>
@@ -2330,7 +2338,7 @@
           <a:p>
             <a:fld id="{7868DACB-D628-CB43-93A3-CD3C3EC12B87}" type="datetimeFigureOut">
               <a:rPr lang="en-US" smtClean="0"/>
-              <a:t>3/8/15</a:t>
+              <a:t>4/8/15</a:t>
             </a:fld>
             <a:endParaRPr lang="en-US"/>
           </a:p>
@@ -2752,7 +2760,7 @@
           <a:p>
             <a:fld id="{7868DACB-D628-CB43-93A3-CD3C3EC12B87}" type="datetimeFigureOut">
               <a:rPr lang="en-US" smtClean="0"/>
-              <a:t>3/8/15</a:t>
+              <a:t>4/8/15</a:t>
             </a:fld>
             <a:endParaRPr lang="en-US"/>
           </a:p>
@@ -2870,7 +2878,7 @@
           <a:p>
             <a:fld id="{7868DACB-D628-CB43-93A3-CD3C3EC12B87}" type="datetimeFigureOut">
               <a:rPr lang="en-US" smtClean="0"/>
-              <a:t>3/8/15</a:t>
+              <a:t>4/8/15</a:t>
             </a:fld>
             <a:endParaRPr lang="en-US"/>
           </a:p>
@@ -2965,7 +2973,7 @@
           <a:p>
             <a:fld id="{7868DACB-D628-CB43-93A3-CD3C3EC12B87}" type="datetimeFigureOut">
               <a:rPr lang="en-US" smtClean="0"/>
-              <a:t>3/8/15</a:t>
+              <a:t>4/8/15</a:t>
             </a:fld>
             <a:endParaRPr lang="en-US"/>
           </a:p>
@@ -3242,7 +3250,7 @@
           <a:p>
             <a:fld id="{7868DACB-D628-CB43-93A3-CD3C3EC12B87}" type="datetimeFigureOut">
               <a:rPr lang="en-US" smtClean="0"/>
-              <a:t>3/8/15</a:t>
+              <a:t>4/8/15</a:t>
             </a:fld>
             <a:endParaRPr lang="en-US"/>
           </a:p>
@@ -3495,7 +3503,7 @@
           <a:p>
             <a:fld id="{7868DACB-D628-CB43-93A3-CD3C3EC12B87}" type="datetimeFigureOut">
               <a:rPr lang="en-US" smtClean="0"/>
-              <a:t>3/8/15</a:t>
+              <a:t>4/8/15</a:t>
             </a:fld>
             <a:endParaRPr lang="en-US"/>
           </a:p>
@@ -3708,7 +3716,7 @@
           <a:p>
             <a:fld id="{7868DACB-D628-CB43-93A3-CD3C3EC12B87}" type="datetimeFigureOut">
               <a:rPr lang="en-US" smtClean="0"/>
-              <a:t>3/8/15</a:t>
+              <a:t>4/8/15</a:t>
             </a:fld>
             <a:endParaRPr lang="en-US"/>
           </a:p>
@@ -4161,6 +4169,13 @@
   <p:clrMapOvr>
     <a:masterClrMapping/>
   </p:clrMapOvr>
+  <p:timing>
+    <p:tnLst>
+      <p:par>
+        <p:cTn xmlns:p14="http://schemas.microsoft.com/office/powerpoint/2010/main" id="1" dur="indefinite" restart="never" nodeType="tmRoot"/>
+      </p:par>
+    </p:tnLst>
+  </p:timing>
 </p:sld>
 </file>
 
@@ -4230,7 +4245,7 @@
             <a:pPr lvl="1"/>
             <a:r>
               <a:rPr lang="en-US" dirty="0" smtClean="0"/>
-              <a:t>Gradient Boost Machine</a:t>
+              <a:t>Gradient Boosting Classifier</a:t>
             </a:r>
           </a:p>
           <a:p>
@@ -4497,6 +4512,39 @@
             </a:endParaRPr>
           </a:p>
           <a:p>
+            <a:r>
+              <a:rPr lang="en-SG" sz="1600" dirty="0">
+                <a:ea typeface="ＭＳ 明朝"/>
+                <a:cs typeface="Calibri"/>
+              </a:rPr>
+              <a:t>Logistic Regression, Neural Network, Support Vector Machine by Andrew Ng</a:t>
+            </a:r>
+          </a:p>
+          <a:p>
+            <a:pPr lvl="1"/>
+            <a:r>
+              <a:rPr lang="en-SG" sz="1600" dirty="0">
+                <a:ea typeface="ＭＳ 明朝"/>
+                <a:cs typeface="Calibri"/>
+                <a:hlinkClick r:id="rId6"/>
+              </a:rPr>
+              <a:t>Week 3 to Week </a:t>
+            </a:r>
+            <a:r>
+              <a:rPr lang="en-SG" sz="1600" dirty="0" smtClean="0">
+                <a:ea typeface="ＭＳ 明朝"/>
+                <a:cs typeface="Calibri"/>
+                <a:hlinkClick r:id="rId6"/>
+              </a:rPr>
+              <a:t>7</a:t>
+            </a:r>
+            <a:endParaRPr lang="en-SG" sz="1600" i="0" u="none" strike="noStrike" baseline="0" dirty="0" smtClean="0">
+              <a:latin typeface="Calibri"/>
+              <a:ea typeface="ＭＳ 明朝"/>
+              <a:cs typeface="Calibri"/>
+            </a:endParaRPr>
+          </a:p>
+          <a:p>
             <a:pPr>
               <a:buClr>
                 <a:srgbClr val="666666"/>
@@ -4519,7 +4567,7 @@
               <a:rPr lang="en-SG" sz="1600" dirty="0">
                 <a:latin typeface="Calibri"/>
                 <a:cs typeface="Calibri"/>
-                <a:hlinkClick r:id="rId6" tooltip="Decision Tree"/>
+                <a:hlinkClick r:id="rId7" tooltip="Decision Tree"/>
               </a:rPr>
               <a:t>Video series</a:t>
             </a:r>
@@ -4548,7 +4596,7 @@
               <a:rPr lang="en-SG" sz="1600" dirty="0" smtClean="0">
                 <a:latin typeface="Calibri"/>
                 <a:cs typeface="Calibri"/>
-                <a:hlinkClick r:id="rId7"/>
+                <a:hlinkClick r:id="rId8"/>
               </a:rPr>
               <a:t>Video</a:t>
             </a:r>
@@ -4556,7 +4604,7 @@
               <a:latin typeface="Calibri"/>
               <a:ea typeface="ＭＳ 明朝"/>
               <a:cs typeface="Calibri"/>
-              <a:hlinkClick r:id="rId7"/>
+              <a:hlinkClick r:id="rId8"/>
             </a:endParaRPr>
           </a:p>
           <a:p>
@@ -4582,7 +4630,7 @@
               <a:rPr lang="en-SG" sz="1600" dirty="0">
                 <a:latin typeface="Calibri"/>
                 <a:cs typeface="Calibri"/>
-                <a:hlinkClick r:id="rId8"/>
+                <a:hlinkClick r:id="rId9"/>
               </a:rPr>
               <a:t>Video</a:t>
             </a:r>
@@ -4598,7 +4646,7 @@
               <a:latin typeface="Calibri"/>
               <a:ea typeface="ＭＳ 明朝"/>
               <a:cs typeface="Calibri"/>
-              <a:hlinkClick r:id="rId8"/>
+              <a:hlinkClick r:id="rId9"/>
             </a:endParaRPr>
           </a:p>
           <a:p>
@@ -4629,48 +4677,12 @@
               <a:rPr lang="en-SG" sz="1600" dirty="0" smtClean="0">
                 <a:latin typeface="Calibri"/>
                 <a:cs typeface="Calibri"/>
-                <a:hlinkClick r:id="rId9"/>
+                <a:hlinkClick r:id="rId10"/>
               </a:rPr>
               <a:t>Video</a:t>
             </a:r>
             <a:endParaRPr lang="en-SG" sz="1600" dirty="0" smtClean="0">
               <a:latin typeface="Calibri"/>
-              <a:cs typeface="Calibri"/>
-            </a:endParaRPr>
-          </a:p>
-          <a:p>
-            <a:r>
-              <a:rPr lang="en-SG" sz="1600" dirty="0" smtClean="0">
-                <a:latin typeface="Calibri"/>
-                <a:ea typeface="ＭＳ 明朝"/>
-                <a:cs typeface="Calibri"/>
-              </a:rPr>
-              <a:t>Logistic Regression, Neural Network, Support Vector Machine by Andrew Ng</a:t>
-            </a:r>
-          </a:p>
-          <a:p>
-            <a:pPr lvl="1"/>
-            <a:r>
-              <a:rPr lang="en-SG" sz="1600" i="0" u="none" strike="noStrike" baseline="0" dirty="0" smtClean="0">
-                <a:latin typeface="Calibri"/>
-                <a:ea typeface="ＭＳ 明朝"/>
-                <a:cs typeface="Calibri"/>
-                <a:hlinkClick r:id="rId10"/>
-              </a:rPr>
-              <a:t>Week</a:t>
-            </a:r>
-            <a:r>
-              <a:rPr lang="en-SG" sz="1600" i="0" u="none" strike="noStrike" dirty="0" smtClean="0">
-                <a:latin typeface="Calibri"/>
-                <a:ea typeface="ＭＳ 明朝"/>
-                <a:cs typeface="Calibri"/>
-                <a:hlinkClick r:id="rId10"/>
-              </a:rPr>
-              <a:t> 3 to Week 7</a:t>
-            </a:r>
-            <a:endParaRPr lang="en-SG" sz="1600" i="0" u="none" strike="noStrike" baseline="0" dirty="0" smtClean="0">
-              <a:latin typeface="Calibri"/>
-              <a:ea typeface="ＭＳ 明朝"/>
               <a:cs typeface="Calibri"/>
             </a:endParaRPr>
           </a:p>
@@ -4725,7 +4737,7 @@
         </p:nvSpPr>
         <p:spPr>
           <a:xfrm>
-            <a:off x="457200" y="1994296"/>
+            <a:off x="457200" y="2562794"/>
             <a:ext cx="8229600" cy="788193"/>
           </a:xfrm>
         </p:spPr>
@@ -4752,7 +4764,7 @@
         </p:nvSpPr>
         <p:spPr>
           <a:xfrm>
-            <a:off x="1946486" y="3418189"/>
+            <a:off x="1656584" y="3777138"/>
             <a:ext cx="5563363" cy="646331"/>
           </a:xfrm>
           <a:prstGeom prst="rect">
@@ -4770,7 +4782,7 @@
               <a:rPr lang="en-US" dirty="0" smtClean="0">
                 <a:hlinkClick r:id="rId2"/>
               </a:rPr>
-              <a:t>https://github.com/newtoncircus/DEXTRA_SourceCodes</a:t>
+              <a:t>http://www.slideshare.net/zhaoqf123/log-lossformindef</a:t>
             </a:r>
             <a:endParaRPr lang="en-US" dirty="0" smtClean="0"/>
           </a:p>
@@ -4789,6 +4801,13 @@
   <p:clrMapOvr>
     <a:masterClrMapping/>
   </p:clrMapOvr>
+  <p:timing>
+    <p:tnLst>
+      <p:par>
+        <p:cTn xmlns:p14="http://schemas.microsoft.com/office/powerpoint/2010/main" id="1" dur="indefinite" restart="never" nodeType="tmRoot"/>
+      </p:par>
+    </p:tnLst>
+  </p:timing>
 </p:sld>
 </file>
 
@@ -4920,7 +4939,22 @@
               <a:rPr lang="en-US" dirty="0" smtClean="0"/>
               <a:t>Area under ROC curve</a:t>
             </a:r>
-            <a:endParaRPr lang="en-US" dirty="0"/>
+          </a:p>
+          <a:p>
+            <a:pPr lvl="1"/>
+            <a:r>
+              <a:rPr lang="en-US" dirty="0" smtClean="0">
+                <a:solidFill>
+                  <a:srgbClr val="FF0000"/>
+                </a:solidFill>
+              </a:rPr>
+              <a:t>Log Loss</a:t>
+            </a:r>
+            <a:endParaRPr lang="en-US" dirty="0">
+              <a:solidFill>
+                <a:srgbClr val="FF0000"/>
+              </a:solidFill>
+            </a:endParaRPr>
           </a:p>
         </p:txBody>
       </p:sp>
@@ -4961,7 +4995,124 @@
   <p:timing>
     <p:tnLst>
       <p:par>
-        <p:cTn xmlns:p14="http://schemas.microsoft.com/office/powerpoint/2010/main" id="1" dur="indefinite" restart="never" nodeType="tmRoot"/>
+        <p:cTn xmlns:p14="http://schemas.microsoft.com/office/powerpoint/2010/main" id="1" dur="indefinite" restart="never" nodeType="tmRoot">
+          <p:childTnLst>
+            <p:seq concurrent="1" nextAc="seek">
+              <p:cTn id="2" dur="indefinite" nodeType="mainSeq">
+                <p:childTnLst>
+                  <p:par>
+                    <p:cTn id="3" fill="hold">
+                      <p:stCondLst>
+                        <p:cond delay="indefinite"/>
+                      </p:stCondLst>
+                      <p:childTnLst>
+                        <p:par>
+                          <p:cTn id="4" fill="hold">
+                            <p:stCondLst>
+                              <p:cond delay="0"/>
+                            </p:stCondLst>
+                            <p:childTnLst>
+                              <p:par>
+                                <p:cTn id="5" presetID="1" presetClass="entr" presetSubtype="0" fill="hold" nodeType="clickEffect">
+                                  <p:stCondLst>
+                                    <p:cond delay="0"/>
+                                  </p:stCondLst>
+                                  <p:childTnLst>
+                                    <p:set>
+                                      <p:cBhvr>
+                                        <p:cTn id="6" dur="1" fill="hold">
+                                          <p:stCondLst>
+                                            <p:cond delay="0"/>
+                                          </p:stCondLst>
+                                        </p:cTn>
+                                        <p:tgtEl>
+                                          <p:spTgt spid="4"/>
+                                        </p:tgtEl>
+                                        <p:attrNameLst>
+                                          <p:attrName>style.visibility</p:attrName>
+                                        </p:attrNameLst>
+                                      </p:cBhvr>
+                                      <p:to>
+                                        <p:strVal val="visible"/>
+                                      </p:to>
+                                    </p:set>
+                                  </p:childTnLst>
+                                </p:cTn>
+                              </p:par>
+                            </p:childTnLst>
+                          </p:cTn>
+                        </p:par>
+                      </p:childTnLst>
+                    </p:cTn>
+                  </p:par>
+                  <p:par>
+                    <p:cTn id="7" fill="hold">
+                      <p:stCondLst>
+                        <p:cond delay="indefinite"/>
+                      </p:stCondLst>
+                      <p:childTnLst>
+                        <p:par>
+                          <p:cTn id="8" fill="hold">
+                            <p:stCondLst>
+                              <p:cond delay="0"/>
+                            </p:stCondLst>
+                            <p:childTnLst>
+                              <p:par>
+                                <p:cTn id="9" presetID="1" presetClass="entr" presetSubtype="0" fill="hold" nodeType="clickEffect">
+                                  <p:stCondLst>
+                                    <p:cond delay="0"/>
+                                  </p:stCondLst>
+                                  <p:childTnLst>
+                                    <p:set>
+                                      <p:cBhvr>
+                                        <p:cTn id="10" dur="1" fill="hold">
+                                          <p:stCondLst>
+                                            <p:cond delay="0"/>
+                                          </p:stCondLst>
+                                        </p:cTn>
+                                        <p:tgtEl>
+                                          <p:spTgt spid="3">
+                                            <p:txEl>
+                                              <p:pRg st="7" end="7"/>
+                                            </p:txEl>
+                                          </p:spTgt>
+                                        </p:tgtEl>
+                                        <p:attrNameLst>
+                                          <p:attrName>style.visibility</p:attrName>
+                                        </p:attrNameLst>
+                                      </p:cBhvr>
+                                      <p:to>
+                                        <p:strVal val="visible"/>
+                                      </p:to>
+                                    </p:set>
+                                  </p:childTnLst>
+                                </p:cTn>
+                              </p:par>
+                            </p:childTnLst>
+                          </p:cTn>
+                        </p:par>
+                      </p:childTnLst>
+                    </p:cTn>
+                  </p:par>
+                </p:childTnLst>
+              </p:cTn>
+              <p:prevCondLst>
+                <p:cond evt="onPrev" delay="0">
+                  <p:tgtEl>
+                    <p:sldTgt/>
+                  </p:tgtEl>
+                </p:cond>
+              </p:prevCondLst>
+              <p:nextCondLst>
+                <p:cond evt="onNext" delay="0">
+                  <p:tgtEl>
+                    <p:sldTgt/>
+                  </p:tgtEl>
+                </p:cond>
+              </p:nextCondLst>
+            </p:seq>
+          </p:childTnLst>
+        </p:cTn>
       </p:par>
     </p:tnLst>
   </p:timing>
@@ -5052,7 +5203,7 @@
           <a:p>
             <a:r>
               <a:rPr lang="en-US" sz="1800" dirty="0" smtClean="0"/>
-              <a:t>N = the number of rows in the test dataset</a:t>
+              <a:t>N = the number of rows in the dataset</a:t>
             </a:r>
           </a:p>
           <a:p>
@@ -5066,7 +5217,7 @@
             </a:r>
             <a:r>
               <a:rPr lang="en-US" sz="1800" dirty="0" err="1" smtClean="0"/>
-              <a:t>ith</a:t>
+              <a:t>i-th</a:t>
             </a:r>
             <a:r>
               <a:rPr lang="en-US" sz="1800" dirty="0" smtClean="0"/>
@@ -5084,7 +5235,7 @@
             </a:r>
             <a:r>
               <a:rPr lang="en-US" sz="1800" dirty="0" err="1" smtClean="0"/>
-              <a:t>ith</a:t>
+              <a:t>i-th</a:t>
             </a:r>
             <a:r>
               <a:rPr lang="en-US" sz="1800" dirty="0" smtClean="0"/>
@@ -5108,7 +5259,7 @@
             </a:r>
             <a:r>
               <a:rPr lang="en-US" sz="1800" dirty="0" smtClean="0"/>
-              <a:t> is replace with max(min(</a:t>
+              <a:t> is replaced with max(min(</a:t>
             </a:r>
             <a:r>
               <a:rPr lang="en-US" sz="1800" dirty="0" err="1" smtClean="0"/>
@@ -5116,7 +5267,7 @@
             </a:r>
             <a:r>
               <a:rPr lang="en-US" sz="1800" dirty="0" smtClean="0"/>
-              <a:t>, 1 - 10-15), 10-15).</a:t>
+              <a:t>, 1 – 10^-15), 10^-15)</a:t>
             </a:r>
             <a:endParaRPr lang="en-US" sz="1800" dirty="0"/>
           </a:p>
@@ -5872,7 +6023,7 @@
           <a:p>
             <a:r>
               <a:rPr lang="en-US" dirty="0" smtClean="0"/>
-              <a:t>Penalize confident wrong prediction very high</a:t>
+              <a:t>Penalize confident wrong prediction high</a:t>
             </a:r>
           </a:p>
           <a:p>

</xml_diff>